<commit_message>
<updated code and plots>
</commit_message>
<xml_diff>
--- a/spacy-tokens/tokenization_presentation_deck.pptx
+++ b/spacy-tokens/tokenization_presentation_deck.pptx
@@ -5,7 +5,7 @@
     <p:sldMasterId id="2147483660" r:id="rId1"/>
   </p:sldMasterIdLst>
   <p:notesMasterIdLst>
-    <p:notesMasterId r:id="rId8"/>
+    <p:notesMasterId r:id="rId10"/>
   </p:notesMasterIdLst>
   <p:sldIdLst>
     <p:sldId id="256" r:id="rId2"/>
@@ -13,7 +13,9 @@
     <p:sldId id="260" r:id="rId4"/>
     <p:sldId id="258" r:id="rId5"/>
     <p:sldId id="261" r:id="rId6"/>
-    <p:sldId id="259" r:id="rId7"/>
+    <p:sldId id="262" r:id="rId7"/>
+    <p:sldId id="263" r:id="rId8"/>
+    <p:sldId id="259" r:id="rId9"/>
   </p:sldIdLst>
   <p:sldSz cx="12192000" cy="6858000"/>
   <p:notesSz cx="6858000" cy="9144000"/>
@@ -123,7 +125,7 @@
 <file path=ppt/revisionInfo.xml><?xml version="1.0" encoding="utf-8"?>
 <p1510:revInfo xmlns:a="http://schemas.openxmlformats.org/drawingml/2006/main" xmlns:r="http://schemas.openxmlformats.org/officeDocument/2006/relationships" xmlns:p1510="http://schemas.microsoft.com/office/powerpoint/2015/10/main">
   <p1510:revLst>
-    <p1510:client id="{8D7B59DC-872E-4C3A-AB8E-7C6D05B82279}" v="1" dt="2022-07-26T00:35:11.488"/>
+    <p1510:client id="{7C320583-7571-4BD6-A2FC-05122ACCE6C0}" v="5" dt="2022-08-12T03:08:01.039"/>
   </p1510:revLst>
 </p1510:revInfo>
 </file>
@@ -233,6 +235,193 @@
       </pc:sldMasterChg>
     </pc:docChg>
   </pc:docChgLst>
+  <pc:docChgLst>
+    <pc:chgData name="Timothy Naudet" userId="3119ffae2e0f3ee9" providerId="LiveId" clId="{7C320583-7571-4BD6-A2FC-05122ACCE6C0}"/>
+    <pc:docChg chg="custSel addSld modSld">
+      <pc:chgData name="Timothy Naudet" userId="3119ffae2e0f3ee9" providerId="LiveId" clId="{7C320583-7571-4BD6-A2FC-05122ACCE6C0}" dt="2022-08-12T03:09:10.517" v="596" actId="1076"/>
+      <pc:docMkLst>
+        <pc:docMk/>
+      </pc:docMkLst>
+      <pc:sldChg chg="modSp mod">
+        <pc:chgData name="Timothy Naudet" userId="3119ffae2e0f3ee9" providerId="LiveId" clId="{7C320583-7571-4BD6-A2FC-05122ACCE6C0}" dt="2022-08-12T02:56:06.717" v="26" actId="20577"/>
+        <pc:sldMkLst>
+          <pc:docMk/>
+          <pc:sldMk cId="509226794" sldId="256"/>
+        </pc:sldMkLst>
+        <pc:spChg chg="mod">
+          <ac:chgData name="Timothy Naudet" userId="3119ffae2e0f3ee9" providerId="LiveId" clId="{7C320583-7571-4BD6-A2FC-05122ACCE6C0}" dt="2022-08-12T02:56:06.717" v="26" actId="20577"/>
+          <ac:spMkLst>
+            <pc:docMk/>
+            <pc:sldMk cId="509226794" sldId="256"/>
+            <ac:spMk id="3" creationId="{CE7DDFEC-AB5E-E158-DEEB-2FF58B9E1047}"/>
+          </ac:spMkLst>
+        </pc:spChg>
+      </pc:sldChg>
+      <pc:sldChg chg="modSp mod">
+        <pc:chgData name="Timothy Naudet" userId="3119ffae2e0f3ee9" providerId="LiveId" clId="{7C320583-7571-4BD6-A2FC-05122ACCE6C0}" dt="2022-08-12T03:07:27.740" v="293" actId="27636"/>
+        <pc:sldMkLst>
+          <pc:docMk/>
+          <pc:sldMk cId="2822997779" sldId="258"/>
+        </pc:sldMkLst>
+        <pc:spChg chg="mod">
+          <ac:chgData name="Timothy Naudet" userId="3119ffae2e0f3ee9" providerId="LiveId" clId="{7C320583-7571-4BD6-A2FC-05122ACCE6C0}" dt="2022-08-12T03:07:27.740" v="293" actId="27636"/>
+          <ac:spMkLst>
+            <pc:docMk/>
+            <pc:sldMk cId="2822997779" sldId="258"/>
+            <ac:spMk id="3" creationId="{37B0EE62-1B2D-29DC-F0B8-A63135C9619A}"/>
+          </ac:spMkLst>
+        </pc:spChg>
+        <pc:picChg chg="mod">
+          <ac:chgData name="Timothy Naudet" userId="3119ffae2e0f3ee9" providerId="LiveId" clId="{7C320583-7571-4BD6-A2FC-05122ACCE6C0}" dt="2022-08-12T02:59:21.080" v="33" actId="1076"/>
+          <ac:picMkLst>
+            <pc:docMk/>
+            <pc:sldMk cId="2822997779" sldId="258"/>
+            <ac:picMk id="5" creationId="{870982BF-1A01-F959-DFF2-149CC7B9B5CE}"/>
+          </ac:picMkLst>
+        </pc:picChg>
+      </pc:sldChg>
+      <pc:sldChg chg="addSp delSp modSp mod">
+        <pc:chgData name="Timothy Naudet" userId="3119ffae2e0f3ee9" providerId="LiveId" clId="{7C320583-7571-4BD6-A2FC-05122ACCE6C0}" dt="2022-08-12T02:59:12.982" v="32" actId="1076"/>
+        <pc:sldMkLst>
+          <pc:docMk/>
+          <pc:sldMk cId="2046214073" sldId="260"/>
+        </pc:sldMkLst>
+        <pc:picChg chg="del">
+          <ac:chgData name="Timothy Naudet" userId="3119ffae2e0f3ee9" providerId="LiveId" clId="{7C320583-7571-4BD6-A2FC-05122ACCE6C0}" dt="2022-08-12T02:57:47.233" v="27" actId="478"/>
+          <ac:picMkLst>
+            <pc:docMk/>
+            <pc:sldMk cId="2046214073" sldId="260"/>
+            <ac:picMk id="5" creationId="{E276F3C5-0436-F476-994C-C0C2EE07E96B}"/>
+          </ac:picMkLst>
+        </pc:picChg>
+        <pc:picChg chg="add mod">
+          <ac:chgData name="Timothy Naudet" userId="3119ffae2e0f3ee9" providerId="LiveId" clId="{7C320583-7571-4BD6-A2FC-05122ACCE6C0}" dt="2022-08-12T02:59:12.982" v="32" actId="1076"/>
+          <ac:picMkLst>
+            <pc:docMk/>
+            <pc:sldMk cId="2046214073" sldId="260"/>
+            <ac:picMk id="7" creationId="{EAB0071E-7788-D051-B32A-A26DD0AD6A05}"/>
+          </ac:picMkLst>
+        </pc:picChg>
+      </pc:sldChg>
+      <pc:sldChg chg="addSp delSp modSp mod">
+        <pc:chgData name="Timothy Naudet" userId="3119ffae2e0f3ee9" providerId="LiveId" clId="{7C320583-7571-4BD6-A2FC-05122ACCE6C0}" dt="2022-08-12T03:06:16.216" v="142" actId="14100"/>
+        <pc:sldMkLst>
+          <pc:docMk/>
+          <pc:sldMk cId="824632909" sldId="261"/>
+        </pc:sldMkLst>
+        <pc:spChg chg="mod">
+          <ac:chgData name="Timothy Naudet" userId="3119ffae2e0f3ee9" providerId="LiveId" clId="{7C320583-7571-4BD6-A2FC-05122ACCE6C0}" dt="2022-08-12T03:05:42.025" v="141" actId="14100"/>
+          <ac:spMkLst>
+            <pc:docMk/>
+            <pc:sldMk cId="824632909" sldId="261"/>
+            <ac:spMk id="2" creationId="{08762200-5F4D-43D5-2202-0AE24B570376}"/>
+          </ac:spMkLst>
+        </pc:spChg>
+        <pc:spChg chg="del">
+          <ac:chgData name="Timothy Naudet" userId="3119ffae2e0f3ee9" providerId="LiveId" clId="{7C320583-7571-4BD6-A2FC-05122ACCE6C0}" dt="2022-08-12T03:05:26.902" v="132"/>
+          <ac:spMkLst>
+            <pc:docMk/>
+            <pc:sldMk cId="824632909" sldId="261"/>
+            <ac:spMk id="18" creationId="{990E022C-9FD2-0764-5FF2-0B637849E404}"/>
+          </ac:spMkLst>
+        </pc:spChg>
+        <pc:picChg chg="add del mod">
+          <ac:chgData name="Timothy Naudet" userId="3119ffae2e0f3ee9" providerId="LiveId" clId="{7C320583-7571-4BD6-A2FC-05122ACCE6C0}" dt="2022-08-12T03:05:31.914" v="137" actId="478"/>
+          <ac:picMkLst>
+            <pc:docMk/>
+            <pc:sldMk cId="824632909" sldId="261"/>
+            <ac:picMk id="5" creationId="{580DD2A6-0830-8617-0145-AD88FE90EED9}"/>
+          </ac:picMkLst>
+        </pc:picChg>
+        <pc:picChg chg="add mod">
+          <ac:chgData name="Timothy Naudet" userId="3119ffae2e0f3ee9" providerId="LiveId" clId="{7C320583-7571-4BD6-A2FC-05122ACCE6C0}" dt="2022-08-12T03:06:16.216" v="142" actId="14100"/>
+          <ac:picMkLst>
+            <pc:docMk/>
+            <pc:sldMk cId="824632909" sldId="261"/>
+            <ac:picMk id="7" creationId="{67396FD8-E97D-0F83-BE25-E25ED410D741}"/>
+          </ac:picMkLst>
+        </pc:picChg>
+        <pc:picChg chg="del">
+          <ac:chgData name="Timothy Naudet" userId="3119ffae2e0f3ee9" providerId="LiveId" clId="{7C320583-7571-4BD6-A2FC-05122ACCE6C0}" dt="2022-08-12T02:59:29.079" v="34" actId="478"/>
+          <ac:picMkLst>
+            <pc:docMk/>
+            <pc:sldMk cId="824632909" sldId="261"/>
+            <ac:picMk id="20" creationId="{0498BB48-8FD8-14D9-9602-669157713116}"/>
+          </ac:picMkLst>
+        </pc:picChg>
+      </pc:sldChg>
+      <pc:sldChg chg="addSp delSp modSp new mod">
+        <pc:chgData name="Timothy Naudet" userId="3119ffae2e0f3ee9" providerId="LiveId" clId="{7C320583-7571-4BD6-A2FC-05122ACCE6C0}" dt="2022-08-12T03:03:21.964" v="129" actId="1076"/>
+        <pc:sldMkLst>
+          <pc:docMk/>
+          <pc:sldMk cId="1033221060" sldId="262"/>
+        </pc:sldMkLst>
+        <pc:spChg chg="mod">
+          <ac:chgData name="Timothy Naudet" userId="3119ffae2e0f3ee9" providerId="LiveId" clId="{7C320583-7571-4BD6-A2FC-05122ACCE6C0}" dt="2022-08-12T03:03:12.557" v="124" actId="20577"/>
+          <ac:spMkLst>
+            <pc:docMk/>
+            <pc:sldMk cId="1033221060" sldId="262"/>
+            <ac:spMk id="2" creationId="{02DC0450-6557-85DC-D81B-A352C9F56C61}"/>
+          </ac:spMkLst>
+        </pc:spChg>
+        <pc:spChg chg="del mod">
+          <ac:chgData name="Timothy Naudet" userId="3119ffae2e0f3ee9" providerId="LiveId" clId="{7C320583-7571-4BD6-A2FC-05122ACCE6C0}" dt="2022-08-12T03:03:16.775" v="125" actId="931"/>
+          <ac:spMkLst>
+            <pc:docMk/>
+            <pc:sldMk cId="1033221060" sldId="262"/>
+            <ac:spMk id="3" creationId="{DD7B6F42-2512-5F82-884B-A13E52D50D64}"/>
+          </ac:spMkLst>
+        </pc:spChg>
+        <pc:picChg chg="add mod">
+          <ac:chgData name="Timothy Naudet" userId="3119ffae2e0f3ee9" providerId="LiveId" clId="{7C320583-7571-4BD6-A2FC-05122ACCE6C0}" dt="2022-08-12T03:03:21.964" v="129" actId="1076"/>
+          <ac:picMkLst>
+            <pc:docMk/>
+            <pc:sldMk cId="1033221060" sldId="262"/>
+            <ac:picMk id="6" creationId="{F3A30BE3-F043-3E09-6CD4-625B149C96E9}"/>
+          </ac:picMkLst>
+        </pc:picChg>
+      </pc:sldChg>
+      <pc:sldChg chg="addSp delSp modSp new mod">
+        <pc:chgData name="Timothy Naudet" userId="3119ffae2e0f3ee9" providerId="LiveId" clId="{7C320583-7571-4BD6-A2FC-05122ACCE6C0}" dt="2022-08-12T03:09:10.517" v="596" actId="1076"/>
+        <pc:sldMkLst>
+          <pc:docMk/>
+          <pc:sldMk cId="890408134" sldId="263"/>
+        </pc:sldMkLst>
+        <pc:spChg chg="mod">
+          <ac:chgData name="Timothy Naudet" userId="3119ffae2e0f3ee9" providerId="LiveId" clId="{7C320583-7571-4BD6-A2FC-05122ACCE6C0}" dt="2022-08-12T03:01:47.042" v="77" actId="20577"/>
+          <ac:spMkLst>
+            <pc:docMk/>
+            <pc:sldMk cId="890408134" sldId="263"/>
+            <ac:spMk id="2" creationId="{552D6797-6E5D-E593-FDD9-B4F1AC22668A}"/>
+          </ac:spMkLst>
+        </pc:spChg>
+        <pc:spChg chg="del mod">
+          <ac:chgData name="Timothy Naudet" userId="3119ffae2e0f3ee9" providerId="LiveId" clId="{7C320583-7571-4BD6-A2FC-05122ACCE6C0}" dt="2022-08-12T03:02:04.730" v="79" actId="931"/>
+          <ac:spMkLst>
+            <pc:docMk/>
+            <pc:sldMk cId="890408134" sldId="263"/>
+            <ac:spMk id="3" creationId="{60837B8C-A04B-F22B-92F3-062C2808BEE5}"/>
+          </ac:spMkLst>
+        </pc:spChg>
+        <pc:spChg chg="add mod">
+          <ac:chgData name="Timothy Naudet" userId="3119ffae2e0f3ee9" providerId="LiveId" clId="{7C320583-7571-4BD6-A2FC-05122ACCE6C0}" dt="2022-08-12T03:09:06.529" v="595" actId="20577"/>
+          <ac:spMkLst>
+            <pc:docMk/>
+            <pc:sldMk cId="890408134" sldId="263"/>
+            <ac:spMk id="7" creationId="{BFAB1B90-08B1-65BE-FBDB-221B3A1ADD62}"/>
+          </ac:spMkLst>
+        </pc:spChg>
+        <pc:picChg chg="add mod">
+          <ac:chgData name="Timothy Naudet" userId="3119ffae2e0f3ee9" providerId="LiveId" clId="{7C320583-7571-4BD6-A2FC-05122ACCE6C0}" dt="2022-08-12T03:09:10.517" v="596" actId="1076"/>
+          <ac:picMkLst>
+            <pc:docMk/>
+            <pc:sldMk cId="890408134" sldId="263"/>
+            <ac:picMk id="6" creationId="{A40DC311-4028-6831-E9FA-4E3A974C6885}"/>
+          </ac:picMkLst>
+        </pc:picChg>
+      </pc:sldChg>
+    </pc:docChg>
+  </pc:docChgLst>
 </pc:chgInfo>
 </file>
 
@@ -318,7 +507,7 @@
           <a:p>
             <a:fld id="{433CB56E-BB90-48C2-9A91-DA4AEC8C5908}" type="datetimeFigureOut">
               <a:rPr lang="en-US" smtClean="0"/>
-              <a:t>8/10/2022</a:t>
+              <a:t>8/11/2022</a:t>
             </a:fld>
             <a:endParaRPr lang="en-US"/>
           </a:p>
@@ -776,7 +965,7 @@
           <a:p>
             <a:fld id="{4B926FEF-9B77-43CB-B9C0-F3F1443559FA}" type="datetime1">
               <a:rPr lang="en-US" smtClean="0"/>
-              <a:t>8/10/2022</a:t>
+              <a:t>8/11/2022</a:t>
             </a:fld>
             <a:endParaRPr lang="en-US"/>
           </a:p>
@@ -1217,7 +1406,7 @@
           <a:p>
             <a:fld id="{A807C6F8-8B67-403E-8589-1B79F9A92F5D}" type="datetime1">
               <a:rPr lang="en-US" smtClean="0"/>
-              <a:t>8/10/2022</a:t>
+              <a:t>8/11/2022</a:t>
             </a:fld>
             <a:endParaRPr lang="en-US"/>
           </a:p>
@@ -1467,7 +1656,7 @@
           <a:p>
             <a:fld id="{7B858FC8-0EA5-453C-9537-21A11BD02866}" type="datetime1">
               <a:rPr lang="en-US" smtClean="0"/>
-              <a:t>8/10/2022</a:t>
+              <a:t>8/11/2022</a:t>
             </a:fld>
             <a:endParaRPr lang="en-US"/>
           </a:p>
@@ -1775,7 +1964,7 @@
           <a:p>
             <a:fld id="{1D881E10-904F-42EB-A4A2-4627399B7256}" type="datetime1">
               <a:rPr lang="en-US" smtClean="0"/>
-              <a:t>8/10/2022</a:t>
+              <a:t>8/11/2022</a:t>
             </a:fld>
             <a:endParaRPr lang="en-US"/>
           </a:p>
@@ -2093,7 +2282,7 @@
           <a:p>
             <a:fld id="{A3D88F1D-29E8-4893-91D4-6398B3A1F44A}" type="datetime1">
               <a:rPr lang="en-US" smtClean="0"/>
-              <a:t>8/10/2022</a:t>
+              <a:t>8/11/2022</a:t>
             </a:fld>
             <a:endParaRPr lang="en-US"/>
           </a:p>
@@ -2395,7 +2584,7 @@
           <a:p>
             <a:fld id="{42379814-6920-4A59-81C6-232C3739F41F}" type="datetime1">
               <a:rPr lang="en-US" smtClean="0"/>
-              <a:t>8/10/2022</a:t>
+              <a:t>8/11/2022</a:t>
             </a:fld>
             <a:endParaRPr lang="en-US"/>
           </a:p>
@@ -2762,7 +2951,7 @@
           <a:p>
             <a:fld id="{AEBB813A-2FED-49AB-9F88-A628D742F235}" type="datetime1">
               <a:rPr lang="en-US" smtClean="0"/>
-              <a:t>8/10/2022</a:t>
+              <a:t>8/11/2022</a:t>
             </a:fld>
             <a:endParaRPr lang="en-US"/>
           </a:p>
@@ -2936,7 +3125,7 @@
           <a:p>
             <a:fld id="{4FFB5E99-0954-42CF-BB52-3A56196F2FA2}" type="datetime1">
               <a:rPr lang="en-US" smtClean="0"/>
-              <a:t>8/10/2022</a:t>
+              <a:t>8/11/2022</a:t>
             </a:fld>
             <a:endParaRPr lang="en-US"/>
           </a:p>
@@ -3116,7 +3305,7 @@
           <a:p>
             <a:fld id="{E71E44A4-4E4F-4216-871D-64F8FB7E0339}" type="datetime1">
               <a:rPr lang="en-US" smtClean="0"/>
-              <a:t>8/10/2022</a:t>
+              <a:t>8/11/2022</a:t>
             </a:fld>
             <a:endParaRPr lang="en-US"/>
           </a:p>
@@ -3286,7 +3475,7 @@
           <a:p>
             <a:fld id="{5DA81EF8-EA81-4F75-9AC6-2868AB885214}" type="datetime1">
               <a:rPr lang="en-US" smtClean="0"/>
-              <a:t>8/10/2022</a:t>
+              <a:t>8/11/2022</a:t>
             </a:fld>
             <a:endParaRPr lang="en-US"/>
           </a:p>
@@ -3536,7 +3725,7 @@
           <a:p>
             <a:fld id="{CA55B1AD-BA32-4FC5-913D-37F49CB8735A}" type="datetime1">
               <a:rPr lang="en-US" smtClean="0"/>
-              <a:t>8/10/2022</a:t>
+              <a:t>8/11/2022</a:t>
             </a:fld>
             <a:endParaRPr lang="en-US"/>
           </a:p>
@@ -3772,7 +3961,7 @@
           <a:p>
             <a:fld id="{CB0AD9A1-9F17-462D-B7FB-D7389AE9EAE5}" type="datetime1">
               <a:rPr lang="en-US" smtClean="0"/>
-              <a:t>8/10/2022</a:t>
+              <a:t>8/11/2022</a:t>
             </a:fld>
             <a:endParaRPr lang="en-US"/>
           </a:p>
@@ -4154,7 +4343,7 @@
           <a:p>
             <a:fld id="{635E00B7-24A3-4FDB-97B0-8E6D9A1DA520}" type="datetime1">
               <a:rPr lang="en-US" smtClean="0"/>
-              <a:t>8/10/2022</a:t>
+              <a:t>8/11/2022</a:t>
             </a:fld>
             <a:endParaRPr lang="en-US"/>
           </a:p>
@@ -4272,7 +4461,7 @@
           <a:p>
             <a:fld id="{BD52946C-FE3E-421D-979F-E1516E48AFAD}" type="datetime1">
               <a:rPr lang="en-US" smtClean="0"/>
-              <a:t>8/10/2022</a:t>
+              <a:t>8/11/2022</a:t>
             </a:fld>
             <a:endParaRPr lang="en-US"/>
           </a:p>
@@ -4367,7 +4556,7 @@
           <a:p>
             <a:fld id="{67BE846A-AE20-429B-BBD0-965173D1E8DF}" type="datetime1">
               <a:rPr lang="en-US" smtClean="0"/>
-              <a:t>8/10/2022</a:t>
+              <a:t>8/11/2022</a:t>
             </a:fld>
             <a:endParaRPr lang="en-US"/>
           </a:p>
@@ -4622,7 +4811,7 @@
           <a:p>
             <a:fld id="{EDCE1A8B-6DC7-48E6-8A03-67B13D765C37}" type="datetime1">
               <a:rPr lang="en-US" smtClean="0"/>
-              <a:t>8/10/2022</a:t>
+              <a:t>8/11/2022</a:t>
             </a:fld>
             <a:endParaRPr lang="en-US"/>
           </a:p>
@@ -4905,7 +5094,7 @@
           <a:p>
             <a:fld id="{1132B5A6-ACCA-44B9-AF6D-D148A8434A2F}" type="datetime1">
               <a:rPr lang="en-US" smtClean="0"/>
-              <a:t>8/10/2022</a:t>
+              <a:t>8/11/2022</a:t>
             </a:fld>
             <a:endParaRPr lang="en-US"/>
           </a:p>
@@ -5311,7 +5500,7 @@
           <a:p>
             <a:fld id="{275963B9-50DF-42CF-801D-7072D71C20A7}" type="datetime1">
               <a:rPr lang="en-US" smtClean="0"/>
-              <a:t>8/10/2022</a:t>
+              <a:t>8/11/2022</a:t>
             </a:fld>
             <a:endParaRPr lang="en-US"/>
           </a:p>
@@ -5896,7 +6085,10 @@
           <a:bodyPr/>
           <a:lstStyle/>
           <a:p>
-            <a:endParaRPr lang="en-US"/>
+            <a:r>
+              <a:rPr lang="en-US" dirty="0"/>
+              <a:t>Timothy J. Naudet</a:t>
+            </a:r>
           </a:p>
         </p:txBody>
       </p:sp>
@@ -6335,12 +6527,41 @@
           </a:p>
         </p:txBody>
       </p:sp>
+      <p:sp>
+        <p:nvSpPr>
+          <p:cNvPr id="6" name="Slide Number Placeholder 5">
+            <a:extLst>
+              <a:ext uri="{FF2B5EF4-FFF2-40B4-BE49-F238E27FC236}">
+                <a16:creationId xmlns:a16="http://schemas.microsoft.com/office/drawing/2014/main" id="{DC7076E3-5BE3-D923-8894-D3803E433CB0}"/>
+              </a:ext>
+            </a:extLst>
+          </p:cNvPr>
+          <p:cNvSpPr>
+            <a:spLocks noGrp="1"/>
+          </p:cNvSpPr>
+          <p:nvPr>
+            <p:ph type="sldNum" sz="quarter" idx="12"/>
+          </p:nvPr>
+        </p:nvSpPr>
+        <p:spPr/>
+        <p:txBody>
+          <a:bodyPr/>
+          <a:lstStyle/>
+          <a:p>
+            <a:fld id="{D5202691-2B13-4EFB-8BE5-C91676ED4EE1}" type="slidenum">
+              <a:rPr lang="en-US" smtClean="0"/>
+              <a:t>3</a:t>
+            </a:fld>
+            <a:endParaRPr lang="en-US"/>
+          </a:p>
+        </p:txBody>
+      </p:sp>
       <p:pic>
         <p:nvPicPr>
-          <p:cNvPr id="5" name="Picture 4">
+          <p:cNvPr id="7" name="Picture 6" descr="Text&#10;&#10;Description automatically generated">
             <a:extLst>
               <a:ext uri="{FF2B5EF4-FFF2-40B4-BE49-F238E27FC236}">
-                <a16:creationId xmlns:a16="http://schemas.microsoft.com/office/drawing/2014/main" id="{E276F3C5-0436-F476-994C-C0C2EE07E96B}"/>
+                <a16:creationId xmlns:a16="http://schemas.microsoft.com/office/drawing/2014/main" id="{EAB0071E-7788-D051-B32A-A26DD0AD6A05}"/>
               </a:ext>
             </a:extLst>
           </p:cNvPr>
@@ -6350,50 +6571,27 @@
           <p:nvPr/>
         </p:nvPicPr>
         <p:blipFill>
-          <a:blip r:embed="rId2"/>
+          <a:blip r:embed="rId2">
+            <a:extLst>
+              <a:ext uri="{28A0092B-C50C-407E-A947-70E740481C1C}">
+                <a14:useLocalDpi xmlns:a14="http://schemas.microsoft.com/office/drawing/2010/main" val="0"/>
+              </a:ext>
+            </a:extLst>
+          </a:blip>
           <a:stretch>
             <a:fillRect/>
           </a:stretch>
         </p:blipFill>
         <p:spPr>
           <a:xfrm>
-            <a:off x="532436" y="2073991"/>
-            <a:ext cx="11127127" cy="4149593"/>
+            <a:off x="676357" y="1911252"/>
+            <a:ext cx="9887079" cy="4587972"/>
           </a:xfrm>
           <a:prstGeom prst="rect">
             <a:avLst/>
           </a:prstGeom>
         </p:spPr>
       </p:pic>
-      <p:sp>
-        <p:nvSpPr>
-          <p:cNvPr id="6" name="Slide Number Placeholder 5">
-            <a:extLst>
-              <a:ext uri="{FF2B5EF4-FFF2-40B4-BE49-F238E27FC236}">
-                <a16:creationId xmlns:a16="http://schemas.microsoft.com/office/drawing/2014/main" id="{DC7076E3-5BE3-D923-8894-D3803E433CB0}"/>
-              </a:ext>
-            </a:extLst>
-          </p:cNvPr>
-          <p:cNvSpPr>
-            <a:spLocks noGrp="1"/>
-          </p:cNvSpPr>
-          <p:nvPr>
-            <p:ph type="sldNum" sz="quarter" idx="12"/>
-          </p:nvPr>
-        </p:nvSpPr>
-        <p:spPr/>
-        <p:txBody>
-          <a:bodyPr/>
-          <a:lstStyle/>
-          <a:p>
-            <a:fld id="{D5202691-2B13-4EFB-8BE5-C91676ED4EE1}" type="slidenum">
-              <a:rPr lang="en-US" smtClean="0"/>
-              <a:t>3</a:t>
-            </a:fld>
-            <a:endParaRPr lang="en-US"/>
-          </a:p>
-        </p:txBody>
-      </p:sp>
     </p:spTree>
     <p:extLst>
       <p:ext uri="{BB962C8B-B14F-4D97-AF65-F5344CB8AC3E}">
@@ -6476,11 +6674,13 @@
         <p:spPr>
           <a:xfrm>
             <a:off x="619432" y="1594131"/>
-            <a:ext cx="8534400" cy="582562"/>
+            <a:ext cx="10613718" cy="582562"/>
           </a:xfrm>
         </p:spPr>
         <p:txBody>
-          <a:bodyPr/>
+          <a:bodyPr>
+            <a:normAutofit fontScale="85000" lnSpcReduction="10000"/>
+          </a:bodyPr>
           <a:lstStyle/>
           <a:p>
             <a:r>
@@ -6489,7 +6689,23 @@
                   <a:schemeClr val="bg1"/>
                 </a:solidFill>
               </a:rPr>
-              <a:t>An example of the created outcome is presented here:</a:t>
+              <a:t>An example of the created outcome is presented below. These metrics, and the averages by column, are provided in the first row and saved in the _</a:t>
+            </a:r>
+            <a:r>
+              <a:rPr lang="en-US" dirty="0" err="1">
+                <a:solidFill>
+                  <a:schemeClr val="bg1"/>
+                </a:solidFill>
+              </a:rPr>
+              <a:t>presenting_json.json</a:t>
+            </a:r>
+            <a:r>
+              <a:rPr lang="en-US" dirty="0">
+                <a:solidFill>
+                  <a:schemeClr val="bg1"/>
+                </a:solidFill>
+              </a:rPr>
+              <a:t> file:</a:t>
             </a:r>
           </a:p>
         </p:txBody>
@@ -6516,7 +6732,7 @@
         </p:blipFill>
         <p:spPr>
           <a:xfrm>
-            <a:off x="619432" y="2557966"/>
+            <a:off x="619432" y="2240466"/>
             <a:ext cx="10953135" cy="4011681"/>
           </a:xfrm>
           <a:prstGeom prst="rect">
@@ -6602,7 +6818,7 @@
         <p:spPr>
           <a:xfrm>
             <a:off x="201612" y="-52918"/>
-            <a:ext cx="8534400" cy="1507067"/>
+            <a:ext cx="5075238" cy="2446868"/>
           </a:xfrm>
         </p:spPr>
         <p:txBody>
@@ -6611,7 +6827,15 @@
           <a:p>
             <a:r>
               <a:rPr lang="en-US" dirty="0"/>
-              <a:t>Produced Tokens</a:t>
+              <a:t>MOST </a:t>
+            </a:r>
+            <a:r>
+              <a:rPr lang="en-US" dirty="0" err="1"/>
+              <a:t>COMMONly</a:t>
+            </a:r>
+            <a:r>
+              <a:rPr lang="en-US" dirty="0"/>
+              <a:t> Produced Tokens</a:t>
             </a:r>
           </a:p>
         </p:txBody>
@@ -6645,59 +6869,39 @@
           </a:p>
         </p:txBody>
       </p:sp>
-      <p:sp>
-        <p:nvSpPr>
-          <p:cNvPr id="18" name="Content Placeholder 17">
+      <p:pic>
+        <p:nvPicPr>
+          <p:cNvPr id="7" name="Content Placeholder 6" descr="Chart, bar chart&#10;&#10;Description automatically generated">
             <a:extLst>
               <a:ext uri="{FF2B5EF4-FFF2-40B4-BE49-F238E27FC236}">
-                <a16:creationId xmlns:a16="http://schemas.microsoft.com/office/drawing/2014/main" id="{990E022C-9FD2-0764-5FF2-0B637849E404}"/>
-              </a:ext>
-            </a:extLst>
-          </p:cNvPr>
-          <p:cNvSpPr>
-            <a:spLocks noGrp="1"/>
-          </p:cNvSpPr>
-          <p:nvPr>
-            <p:ph idx="1"/>
-          </p:nvPr>
-        </p:nvSpPr>
-        <p:spPr/>
-        <p:txBody>
-          <a:bodyPr/>
-          <a:lstStyle/>
-          <a:p>
-            <a:endParaRPr lang="en-US" dirty="0"/>
-          </a:p>
-        </p:txBody>
-      </p:sp>
-      <p:pic>
-        <p:nvPicPr>
-          <p:cNvPr id="20" name="Picture 19">
-            <a:extLst>
-              <a:ext uri="{FF2B5EF4-FFF2-40B4-BE49-F238E27FC236}">
-                <a16:creationId xmlns:a16="http://schemas.microsoft.com/office/drawing/2014/main" id="{0498BB48-8FD8-14D9-9602-669157713116}"/>
+                <a16:creationId xmlns:a16="http://schemas.microsoft.com/office/drawing/2014/main" id="{67396FD8-E97D-0F83-BE25-E25ED410D741}"/>
               </a:ext>
             </a:extLst>
           </p:cNvPr>
           <p:cNvPicPr>
-            <a:picLocks noChangeAspect="1"/>
+            <a:picLocks noGrp="1" noChangeAspect="1"/>
           </p:cNvPicPr>
-          <p:nvPr/>
+          <p:nvPr>
+            <p:ph idx="1"/>
+          </p:nvPr>
         </p:nvPicPr>
         <p:blipFill>
-          <a:blip r:embed="rId2"/>
+          <a:blip r:embed="rId2">
+            <a:extLst>
+              <a:ext uri="{28A0092B-C50C-407E-A947-70E740481C1C}">
+                <a14:useLocalDpi xmlns:a14="http://schemas.microsoft.com/office/drawing/2010/main" val="0"/>
+              </a:ext>
+            </a:extLst>
+          </a:blip>
           <a:stretch>
             <a:fillRect/>
           </a:stretch>
         </p:blipFill>
         <p:spPr>
           <a:xfrm>
-            <a:off x="1258888" y="1154949"/>
-            <a:ext cx="9923462" cy="5471135"/>
+            <a:off x="5988051" y="76201"/>
+            <a:ext cx="5577642" cy="6668294"/>
           </a:xfrm>
-          <a:prstGeom prst="rect">
-            <a:avLst/>
-          </a:prstGeom>
         </p:spPr>
       </p:pic>
     </p:spTree>
@@ -6735,6 +6939,304 @@
           <p:cNvPr id="2" name="Title 1">
             <a:extLst>
               <a:ext uri="{FF2B5EF4-FFF2-40B4-BE49-F238E27FC236}">
+                <a16:creationId xmlns:a16="http://schemas.microsoft.com/office/drawing/2014/main" id="{02DC0450-6557-85DC-D81B-A352C9F56C61}"/>
+              </a:ext>
+            </a:extLst>
+          </p:cNvPr>
+          <p:cNvSpPr>
+            <a:spLocks noGrp="1"/>
+          </p:cNvSpPr>
+          <p:nvPr>
+            <p:ph type="title"/>
+          </p:nvPr>
+        </p:nvSpPr>
+        <p:spPr>
+          <a:xfrm>
+            <a:off x="334962" y="270932"/>
+            <a:ext cx="8534400" cy="1507067"/>
+          </a:xfrm>
+        </p:spPr>
+        <p:txBody>
+          <a:bodyPr/>
+          <a:lstStyle/>
+          <a:p>
+            <a:r>
+              <a:rPr lang="en-US" dirty="0"/>
+              <a:t>TF-IDF – NNMF Top words</a:t>
+            </a:r>
+          </a:p>
+        </p:txBody>
+      </p:sp>
+      <p:pic>
+        <p:nvPicPr>
+          <p:cNvPr id="6" name="Content Placeholder 5" descr="Chart&#10;&#10;Description automatically generated">
+            <a:extLst>
+              <a:ext uri="{FF2B5EF4-FFF2-40B4-BE49-F238E27FC236}">
+                <a16:creationId xmlns:a16="http://schemas.microsoft.com/office/drawing/2014/main" id="{F3A30BE3-F043-3E09-6CD4-625B149C96E9}"/>
+              </a:ext>
+            </a:extLst>
+          </p:cNvPr>
+          <p:cNvPicPr>
+            <a:picLocks noGrp="1" noChangeAspect="1"/>
+          </p:cNvPicPr>
+          <p:nvPr>
+            <p:ph idx="1"/>
+          </p:nvPr>
+        </p:nvPicPr>
+        <p:blipFill>
+          <a:blip r:embed="rId2">
+            <a:extLst>
+              <a:ext uri="{28A0092B-C50C-407E-A947-70E740481C1C}">
+                <a14:useLocalDpi xmlns:a14="http://schemas.microsoft.com/office/drawing/2010/main" val="0"/>
+              </a:ext>
+            </a:extLst>
+          </a:blip>
+          <a:stretch>
+            <a:fillRect/>
+          </a:stretch>
+        </p:blipFill>
+        <p:spPr>
+          <a:xfrm>
+            <a:off x="1228724" y="1627186"/>
+            <a:ext cx="8969375" cy="4484688"/>
+          </a:xfrm>
+        </p:spPr>
+      </p:pic>
+      <p:sp>
+        <p:nvSpPr>
+          <p:cNvPr id="4" name="Slide Number Placeholder 3">
+            <a:extLst>
+              <a:ext uri="{FF2B5EF4-FFF2-40B4-BE49-F238E27FC236}">
+                <a16:creationId xmlns:a16="http://schemas.microsoft.com/office/drawing/2014/main" id="{9802FD79-94A7-E4C5-B039-E262FE5BBB2A}"/>
+              </a:ext>
+            </a:extLst>
+          </p:cNvPr>
+          <p:cNvSpPr>
+            <a:spLocks noGrp="1"/>
+          </p:cNvSpPr>
+          <p:nvPr>
+            <p:ph type="sldNum" sz="quarter" idx="12"/>
+          </p:nvPr>
+        </p:nvSpPr>
+        <p:spPr/>
+        <p:txBody>
+          <a:bodyPr/>
+          <a:lstStyle/>
+          <a:p>
+            <a:fld id="{D5202691-2B13-4EFB-8BE5-C91676ED4EE1}" type="slidenum">
+              <a:rPr lang="en-US" smtClean="0"/>
+              <a:t>6</a:t>
+            </a:fld>
+            <a:endParaRPr lang="en-US"/>
+          </a:p>
+        </p:txBody>
+      </p:sp>
+    </p:spTree>
+    <p:extLst>
+      <p:ext uri="{BB962C8B-B14F-4D97-AF65-F5344CB8AC3E}">
+        <p14:creationId xmlns:p14="http://schemas.microsoft.com/office/powerpoint/2010/main" val="1033221060"/>
+      </p:ext>
+    </p:extLst>
+  </p:cSld>
+  <p:clrMapOvr>
+    <a:masterClrMapping/>
+  </p:clrMapOvr>
+</p:sld>
+</file>
+
+<file path=ppt/slides/slide7.xml><?xml version="1.0" encoding="utf-8"?>
+<p:sld xmlns:a="http://schemas.openxmlformats.org/drawingml/2006/main" xmlns:r="http://schemas.openxmlformats.org/officeDocument/2006/relationships" xmlns:p="http://schemas.openxmlformats.org/presentationml/2006/main">
+  <p:cSld>
+    <p:spTree>
+      <p:nvGrpSpPr>
+        <p:cNvPr id="1" name=""/>
+        <p:cNvGrpSpPr/>
+        <p:nvPr/>
+      </p:nvGrpSpPr>
+      <p:grpSpPr>
+        <a:xfrm>
+          <a:off x="0" y="0"/>
+          <a:ext cx="0" cy="0"/>
+          <a:chOff x="0" y="0"/>
+          <a:chExt cx="0" cy="0"/>
+        </a:xfrm>
+      </p:grpSpPr>
+      <p:sp>
+        <p:nvSpPr>
+          <p:cNvPr id="2" name="Title 1">
+            <a:extLst>
+              <a:ext uri="{FF2B5EF4-FFF2-40B4-BE49-F238E27FC236}">
+                <a16:creationId xmlns:a16="http://schemas.microsoft.com/office/drawing/2014/main" id="{552D6797-6E5D-E593-FDD9-B4F1AC22668A}"/>
+              </a:ext>
+            </a:extLst>
+          </p:cNvPr>
+          <p:cNvSpPr>
+            <a:spLocks noGrp="1"/>
+          </p:cNvSpPr>
+          <p:nvPr>
+            <p:ph type="title"/>
+          </p:nvPr>
+        </p:nvSpPr>
+        <p:spPr>
+          <a:xfrm>
+            <a:off x="411162" y="334432"/>
+            <a:ext cx="8534400" cy="1507067"/>
+          </a:xfrm>
+        </p:spPr>
+        <p:txBody>
+          <a:bodyPr/>
+          <a:lstStyle/>
+          <a:p>
+            <a:r>
+              <a:rPr lang="en-US" dirty="0"/>
+              <a:t>TF-IFD and PCA Plot</a:t>
+            </a:r>
+          </a:p>
+        </p:txBody>
+      </p:sp>
+      <p:pic>
+        <p:nvPicPr>
+          <p:cNvPr id="6" name="Content Placeholder 5" descr="Chart, scatter chart&#10;&#10;Description automatically generated">
+            <a:extLst>
+              <a:ext uri="{FF2B5EF4-FFF2-40B4-BE49-F238E27FC236}">
+                <a16:creationId xmlns:a16="http://schemas.microsoft.com/office/drawing/2014/main" id="{A40DC311-4028-6831-E9FA-4E3A974C6885}"/>
+              </a:ext>
+            </a:extLst>
+          </p:cNvPr>
+          <p:cNvPicPr>
+            <a:picLocks noGrp="1" noChangeAspect="1"/>
+          </p:cNvPicPr>
+          <p:nvPr>
+            <p:ph idx="1"/>
+          </p:nvPr>
+        </p:nvPicPr>
+        <p:blipFill>
+          <a:blip r:embed="rId2">
+            <a:extLst>
+              <a:ext uri="{28A0092B-C50C-407E-A947-70E740481C1C}">
+                <a14:useLocalDpi xmlns:a14="http://schemas.microsoft.com/office/drawing/2010/main" val="0"/>
+              </a:ext>
+            </a:extLst>
+          </a:blip>
+          <a:stretch>
+            <a:fillRect/>
+          </a:stretch>
+        </p:blipFill>
+        <p:spPr>
+          <a:xfrm>
+            <a:off x="6300788" y="1621631"/>
+            <a:ext cx="4819650" cy="3614738"/>
+          </a:xfrm>
+        </p:spPr>
+      </p:pic>
+      <p:sp>
+        <p:nvSpPr>
+          <p:cNvPr id="4" name="Slide Number Placeholder 3">
+            <a:extLst>
+              <a:ext uri="{FF2B5EF4-FFF2-40B4-BE49-F238E27FC236}">
+                <a16:creationId xmlns:a16="http://schemas.microsoft.com/office/drawing/2014/main" id="{6A07E979-98CE-26DF-FF9A-02F0A760C062}"/>
+              </a:ext>
+            </a:extLst>
+          </p:cNvPr>
+          <p:cNvSpPr>
+            <a:spLocks noGrp="1"/>
+          </p:cNvSpPr>
+          <p:nvPr>
+            <p:ph type="sldNum" sz="quarter" idx="12"/>
+          </p:nvPr>
+        </p:nvSpPr>
+        <p:spPr/>
+        <p:txBody>
+          <a:bodyPr/>
+          <a:lstStyle/>
+          <a:p>
+            <a:fld id="{D5202691-2B13-4EFB-8BE5-C91676ED4EE1}" type="slidenum">
+              <a:rPr lang="en-US" smtClean="0"/>
+              <a:t>7</a:t>
+            </a:fld>
+            <a:endParaRPr lang="en-US"/>
+          </a:p>
+        </p:txBody>
+      </p:sp>
+      <p:sp>
+        <p:nvSpPr>
+          <p:cNvPr id="7" name="TextBox 6">
+            <a:extLst>
+              <a:ext uri="{FF2B5EF4-FFF2-40B4-BE49-F238E27FC236}">
+                <a16:creationId xmlns:a16="http://schemas.microsoft.com/office/drawing/2014/main" id="{BFAB1B90-08B1-65BE-FBDB-221B3A1ADD62}"/>
+              </a:ext>
+            </a:extLst>
+          </p:cNvPr>
+          <p:cNvSpPr txBox="1"/>
+          <p:nvPr/>
+        </p:nvSpPr>
+        <p:spPr>
+          <a:xfrm>
+            <a:off x="520700" y="1727200"/>
+            <a:ext cx="5111750" cy="2308324"/>
+          </a:xfrm>
+          <a:prstGeom prst="rect">
+            <a:avLst/>
+          </a:prstGeom>
+          <a:noFill/>
+        </p:spPr>
+        <p:txBody>
+          <a:bodyPr wrap="square" rtlCol="0">
+            <a:spAutoFit/>
+          </a:bodyPr>
+          <a:lstStyle/>
+          <a:p>
+            <a:r>
+              <a:rPr lang="en-US" dirty="0"/>
+              <a:t>This plot illustrates the PCA reduced dimensions of the TF-IDF vectorized data of all the text contained in the error messages.</a:t>
+            </a:r>
+          </a:p>
+          <a:p>
+            <a:endParaRPr lang="en-US" dirty="0"/>
+          </a:p>
+          <a:p>
+            <a:r>
+              <a:rPr lang="en-US" dirty="0"/>
+              <a:t>This plot indicates a dichotomy of correlated and uncorrelated words. Few words tend to stay aligned in the normalized axis of the reduced dimensions of the text.</a:t>
+            </a:r>
+          </a:p>
+        </p:txBody>
+      </p:sp>
+    </p:spTree>
+    <p:extLst>
+      <p:ext uri="{BB962C8B-B14F-4D97-AF65-F5344CB8AC3E}">
+        <p14:creationId xmlns:p14="http://schemas.microsoft.com/office/powerpoint/2010/main" val="890408134"/>
+      </p:ext>
+    </p:extLst>
+  </p:cSld>
+  <p:clrMapOvr>
+    <a:masterClrMapping/>
+  </p:clrMapOvr>
+</p:sld>
+</file>
+
+<file path=ppt/slides/slide8.xml><?xml version="1.0" encoding="utf-8"?>
+<p:sld xmlns:a="http://schemas.openxmlformats.org/drawingml/2006/main" xmlns:r="http://schemas.openxmlformats.org/officeDocument/2006/relationships" xmlns:p="http://schemas.openxmlformats.org/presentationml/2006/main">
+  <p:cSld>
+    <p:spTree>
+      <p:nvGrpSpPr>
+        <p:cNvPr id="1" name=""/>
+        <p:cNvGrpSpPr/>
+        <p:nvPr/>
+      </p:nvGrpSpPr>
+      <p:grpSpPr>
+        <a:xfrm>
+          <a:off x="0" y="0"/>
+          <a:ext cx="0" cy="0"/>
+          <a:chOff x="0" y="0"/>
+          <a:chExt cx="0" cy="0"/>
+        </a:xfrm>
+      </p:grpSpPr>
+      <p:sp>
+        <p:nvSpPr>
+          <p:cNvPr id="2" name="Title 1">
+            <a:extLst>
+              <a:ext uri="{FF2B5EF4-FFF2-40B4-BE49-F238E27FC236}">
                 <a16:creationId xmlns:a16="http://schemas.microsoft.com/office/drawing/2014/main" id="{8AE36B54-DC2B-9EC3-2F53-5D80AF661E84}"/>
               </a:ext>
             </a:extLst>
@@ -6946,7 +7448,7 @@
           <a:p>
             <a:fld id="{D5202691-2B13-4EFB-8BE5-C91676ED4EE1}" type="slidenum">
               <a:rPr lang="en-US" smtClean="0"/>
-              <a:t>6</a:t>
+              <a:t>8</a:t>
             </a:fld>
             <a:endParaRPr lang="en-US"/>
           </a:p>

</xml_diff>